<commit_message>
Reorganized slides, updates and corrections
</commit_message>
<xml_diff>
--- a/slides/11_DimensionalityReduction_Part1.pptx
+++ b/slides/11_DimensionalityReduction_Part1.pptx
@@ -13,9 +13,9 @@
     <p:sldId id="603" r:id="rId4"/>
     <p:sldId id="757" r:id="rId5"/>
     <p:sldId id="634" r:id="rId6"/>
-    <p:sldId id="746" r:id="rId7"/>
-    <p:sldId id="677" r:id="rId8"/>
-    <p:sldId id="755" r:id="rId9"/>
+    <p:sldId id="677" r:id="rId7"/>
+    <p:sldId id="755" r:id="rId8"/>
+    <p:sldId id="746" r:id="rId9"/>
     <p:sldId id="756" r:id="rId10"/>
     <p:sldId id="758" r:id="rId11"/>
     <p:sldId id="723" r:id="rId12"/>
@@ -239,7 +239,7 @@
           <a:p>
             <a:fld id="{ED460DB7-3564-4028-881B-4A225B453265}" type="datetimeFigureOut">
               <a:rPr lang="en-US" smtClean="0"/>
-              <a:t>4/15/2025</a:t>
+              <a:t>4/16/2025</a:t>
             </a:fld>
             <a:endParaRPr lang="en-US"/>
           </a:p>
@@ -2451,7 +2451,7 @@
     </p:spTree>
     <p:extLst>
       <p:ext uri="{BB962C8B-B14F-4D97-AF65-F5344CB8AC3E}">
-        <p14:creationId xmlns:p14="http://schemas.microsoft.com/office/powerpoint/2010/main" val="1665830831"/>
+        <p14:creationId xmlns:p14="http://schemas.microsoft.com/office/powerpoint/2010/main" val="2976857061"/>
       </p:ext>
     </p:extLst>
   </p:cSld>
@@ -2536,7 +2536,7 @@
     </p:spTree>
     <p:extLst>
       <p:ext uri="{BB962C8B-B14F-4D97-AF65-F5344CB8AC3E}">
-        <p14:creationId xmlns:p14="http://schemas.microsoft.com/office/powerpoint/2010/main" val="2976857061"/>
+        <p14:creationId xmlns:p14="http://schemas.microsoft.com/office/powerpoint/2010/main" val="2230216842"/>
       </p:ext>
     </p:extLst>
   </p:cSld>
@@ -2621,7 +2621,7 @@
     </p:spTree>
     <p:extLst>
       <p:ext uri="{BB962C8B-B14F-4D97-AF65-F5344CB8AC3E}">
-        <p14:creationId xmlns:p14="http://schemas.microsoft.com/office/powerpoint/2010/main" val="2230216842"/>
+        <p14:creationId xmlns:p14="http://schemas.microsoft.com/office/powerpoint/2010/main" val="1665830831"/>
       </p:ext>
     </p:extLst>
   </p:cSld>
@@ -3118,7 +3118,7 @@
           <a:p>
             <a:fld id="{C62B3463-61C8-4819-BC9A-C94FD847F060}" type="datetimeFigureOut">
               <a:rPr lang="en-US" smtClean="0"/>
-              <a:t>4/15/2025</a:t>
+              <a:t>4/16/2025</a:t>
             </a:fld>
             <a:endParaRPr lang="en-US"/>
           </a:p>
@@ -3316,7 +3316,7 @@
           <a:p>
             <a:fld id="{C62B3463-61C8-4819-BC9A-C94FD847F060}" type="datetimeFigureOut">
               <a:rPr lang="en-US" smtClean="0"/>
-              <a:t>4/15/2025</a:t>
+              <a:t>4/16/2025</a:t>
             </a:fld>
             <a:endParaRPr lang="en-US"/>
           </a:p>
@@ -3524,7 +3524,7 @@
           <a:p>
             <a:fld id="{C62B3463-61C8-4819-BC9A-C94FD847F060}" type="datetimeFigureOut">
               <a:rPr lang="en-US" smtClean="0"/>
-              <a:t>4/15/2025</a:t>
+              <a:t>4/16/2025</a:t>
             </a:fld>
             <a:endParaRPr lang="en-US"/>
           </a:p>
@@ -4287,7 +4287,7 @@
           <a:p>
             <a:fld id="{4ACD6B4E-9726-48B7-95FC-86DC5068328F}" type="datetimeFigureOut">
               <a:rPr lang="en-US" smtClean="0"/>
-              <a:t>4/15/2025</a:t>
+              <a:t>4/16/2025</a:t>
             </a:fld>
             <a:endParaRPr lang="en-US"/>
           </a:p>
@@ -4485,7 +4485,7 @@
           <a:p>
             <a:fld id="{C62B3463-61C8-4819-BC9A-C94FD847F060}" type="datetimeFigureOut">
               <a:rPr lang="en-US" smtClean="0"/>
-              <a:t>4/15/2025</a:t>
+              <a:t>4/16/2025</a:t>
             </a:fld>
             <a:endParaRPr lang="en-US"/>
           </a:p>
@@ -4760,7 +4760,7 @@
           <a:p>
             <a:fld id="{C62B3463-61C8-4819-BC9A-C94FD847F060}" type="datetimeFigureOut">
               <a:rPr lang="en-US" smtClean="0"/>
-              <a:t>4/15/2025</a:t>
+              <a:t>4/16/2025</a:t>
             </a:fld>
             <a:endParaRPr lang="en-US"/>
           </a:p>
@@ -5025,7 +5025,7 @@
           <a:p>
             <a:fld id="{C62B3463-61C8-4819-BC9A-C94FD847F060}" type="datetimeFigureOut">
               <a:rPr lang="en-US" smtClean="0"/>
-              <a:t>4/15/2025</a:t>
+              <a:t>4/16/2025</a:t>
             </a:fld>
             <a:endParaRPr lang="en-US"/>
           </a:p>
@@ -5437,7 +5437,7 @@
           <a:p>
             <a:fld id="{C62B3463-61C8-4819-BC9A-C94FD847F060}" type="datetimeFigureOut">
               <a:rPr lang="en-US" smtClean="0"/>
-              <a:t>4/15/2025</a:t>
+              <a:t>4/16/2025</a:t>
             </a:fld>
             <a:endParaRPr lang="en-US"/>
           </a:p>
@@ -5578,7 +5578,7 @@
           <a:p>
             <a:fld id="{C62B3463-61C8-4819-BC9A-C94FD847F060}" type="datetimeFigureOut">
               <a:rPr lang="en-US" smtClean="0"/>
-              <a:t>4/15/2025</a:t>
+              <a:t>4/16/2025</a:t>
             </a:fld>
             <a:endParaRPr lang="en-US"/>
           </a:p>
@@ -5691,7 +5691,7 @@
           <a:p>
             <a:fld id="{C62B3463-61C8-4819-BC9A-C94FD847F060}" type="datetimeFigureOut">
               <a:rPr lang="en-US" smtClean="0"/>
-              <a:t>4/15/2025</a:t>
+              <a:t>4/16/2025</a:t>
             </a:fld>
             <a:endParaRPr lang="en-US"/>
           </a:p>
@@ -6002,7 +6002,7 @@
           <a:p>
             <a:fld id="{C62B3463-61C8-4819-BC9A-C94FD847F060}" type="datetimeFigureOut">
               <a:rPr lang="en-US" smtClean="0"/>
-              <a:t>4/15/2025</a:t>
+              <a:t>4/16/2025</a:t>
             </a:fld>
             <a:endParaRPr lang="en-US"/>
           </a:p>
@@ -6290,7 +6290,7 @@
           <a:p>
             <a:fld id="{C62B3463-61C8-4819-BC9A-C94FD847F060}" type="datetimeFigureOut">
               <a:rPr lang="en-US" smtClean="0"/>
-              <a:t>4/15/2025</a:t>
+              <a:t>4/16/2025</a:t>
             </a:fld>
             <a:endParaRPr lang="en-US"/>
           </a:p>
@@ -6531,7 +6531,7 @@
           <a:p>
             <a:fld id="{C62B3463-61C8-4819-BC9A-C94FD847F060}" type="datetimeFigureOut">
               <a:rPr lang="en-US" smtClean="0"/>
-              <a:t>4/15/2025</a:t>
+              <a:t>4/16/2025</a:t>
             </a:fld>
             <a:endParaRPr lang="en-US"/>
           </a:p>
@@ -9133,8 +9133,8 @@
           </a:p>
         </p:txBody>
       </p:sp>
-      <mc:AlternateContent xmlns:mc="http://schemas.openxmlformats.org/markup-compatibility/2006">
-        <mc:Choice xmlns:a14="http://schemas.microsoft.com/office/drawing/2010/main" Requires="a14">
+      <mc:AlternateContent xmlns:mc="http://schemas.openxmlformats.org/markup-compatibility/2006" xmlns:a14="http://schemas.microsoft.com/office/drawing/2010/main">
+        <mc:Choice Requires="a14">
           <p:sp>
             <p:nvSpPr>
               <p:cNvPr id="3" name="Content Placeholder 2"/>
@@ -9190,7 +9190,7 @@
                   <m:oMath xmlns:m="http://schemas.openxmlformats.org/officeDocument/2006/math">
                     <m:r>
                       <a:rPr lang="en-US" i="1">
-                        <a:latin typeface="+mn-lt"/>
+                        <a:latin typeface="Cambria Math" panose="02040503050406030204" pitchFamily="18" charset="0"/>
                       </a:rPr>
                       <m:t>𝑝</m:t>
                     </m:r>
@@ -9206,7 +9206,7 @@
                   <m:oMath xmlns:m="http://schemas.openxmlformats.org/officeDocument/2006/math">
                     <m:r>
                       <a:rPr lang="en-US" i="1">
-                        <a:latin typeface="+mn-lt"/>
+                        <a:latin typeface="Cambria Math" panose="02040503050406030204" pitchFamily="18" charset="0"/>
                       </a:rPr>
                       <m:t>𝑙</m:t>
                     </m:r>
@@ -9407,7 +9407,7 @@
             </p:txBody>
           </p:sp>
         </mc:Choice>
-        <mc:Fallback>
+        <mc:Fallback xmlns="">
           <p:sp>
             <p:nvSpPr>
               <p:cNvPr id="3" name="Content Placeholder 2"/>
@@ -10971,8 +10971,8 @@
           </a:p>
         </p:txBody>
       </p:sp>
-      <mc:AlternateContent xmlns:mc="http://schemas.openxmlformats.org/markup-compatibility/2006">
-        <mc:Choice xmlns:a14="http://schemas.microsoft.com/office/drawing/2010/main" Requires="a14">
+      <mc:AlternateContent xmlns:mc="http://schemas.openxmlformats.org/markup-compatibility/2006" xmlns:a14="http://schemas.microsoft.com/office/drawing/2010/main">
+        <mc:Choice Requires="a14">
           <p:sp>
             <p:nvSpPr>
               <p:cNvPr id="3" name="Content Placeholder 2">
@@ -11411,7 +11411,7 @@
             </p:txBody>
           </p:sp>
         </mc:Choice>
-        <mc:Fallback>
+        <mc:Fallback xmlns="">
           <p:sp>
             <p:nvSpPr>
               <p:cNvPr id="3" name="Content Placeholder 2">
@@ -12362,8 +12362,8 @@
           </a:p>
         </p:txBody>
       </p:sp>
-      <mc:AlternateContent xmlns:mc="http://schemas.openxmlformats.org/markup-compatibility/2006">
-        <mc:Choice xmlns:a14="http://schemas.microsoft.com/office/drawing/2010/main" Requires="a14">
+      <mc:AlternateContent xmlns:mc="http://schemas.openxmlformats.org/markup-compatibility/2006" xmlns:a14="http://schemas.microsoft.com/office/drawing/2010/main">
+        <mc:Choice Requires="a14">
           <p:sp>
             <p:nvSpPr>
               <p:cNvPr id="3" name="Content Placeholder 2"/>
@@ -12531,7 +12531,7 @@
             </p:txBody>
           </p:sp>
         </mc:Choice>
-        <mc:Fallback>
+        <mc:Fallback xmlns="">
           <p:sp>
             <p:nvSpPr>
               <p:cNvPr id="3" name="Content Placeholder 2"/>
@@ -13822,19 +13822,7 @@
                   <a:rPr lang="en-US" dirty="0">
                     <a:cs typeface="Segoe UI" panose="020B0502040204020203" pitchFamily="34" charset="0"/>
                   </a:rPr>
-                  <a:t>PC in decreasing order of </a:t>
-                </a:r>
-                <a:r>
-                  <a:rPr lang="en-US" dirty="0" err="1">
-                    <a:cs typeface="Segoe UI" panose="020B0502040204020203" pitchFamily="34" charset="0"/>
-                  </a:rPr>
-                  <a:t>magnitudea</a:t>
-                </a:r>
-                <a:r>
-                  <a:rPr lang="en-US" dirty="0">
-                    <a:cs typeface="Segoe UI" panose="020B0502040204020203" pitchFamily="34" charset="0"/>
-                  </a:rPr>
-                  <a:t> of eigenvalues of </a:t>
+                  <a:t>PC in decreasing order of magnitude of eigenvalues of </a:t>
                 </a:r>
                 <a14:m>
                   <m:oMath xmlns:m="http://schemas.openxmlformats.org/officeDocument/2006/math">
@@ -15320,8 +15308,8 @@
           </a:p>
         </p:txBody>
       </p:sp>
-      <mc:AlternateContent xmlns:mc="http://schemas.openxmlformats.org/markup-compatibility/2006">
-        <mc:Choice xmlns:a14="http://schemas.microsoft.com/office/drawing/2010/main" Requires="a14">
+      <mc:AlternateContent xmlns:mc="http://schemas.openxmlformats.org/markup-compatibility/2006" xmlns:a14="http://schemas.microsoft.com/office/drawing/2010/main">
+        <mc:Choice Requires="a14">
           <p:sp>
             <p:nvSpPr>
               <p:cNvPr id="7" name="TextBox 6">
@@ -15368,7 +15356,7 @@
             </p:txBody>
           </p:sp>
         </mc:Choice>
-        <mc:Fallback>
+        <mc:Fallback xmlns="">
           <p:sp>
             <p:nvSpPr>
               <p:cNvPr id="7" name="TextBox 6">
@@ -16373,21 +16361,21 @@
                           <a:latin typeface="Cambria Math" panose="02040503050406030204" pitchFamily="18" charset="0"/>
                           <a:cs typeface="Segoe UI" panose="020B0502040204020203" pitchFamily="34" charset="0"/>
                         </a:rPr>
-                        <m:t>𝑝</m:t>
+                        <m:t>𝑙</m:t>
                       </m:r>
                       <m:r>
                         <a:rPr lang="en-US" b="0" i="1" smtClean="0">
                           <a:latin typeface="Cambria Math" panose="02040503050406030204" pitchFamily="18" charset="0"/>
                           <a:cs typeface="Segoe UI" panose="020B0502040204020203" pitchFamily="34" charset="0"/>
                         </a:rPr>
-                        <m:t>&gt;</m:t>
+                        <m:t>&lt;</m:t>
                       </m:r>
                       <m:r>
                         <a:rPr lang="en-US" b="0" i="1" smtClean="0">
                           <a:latin typeface="Cambria Math" panose="02040503050406030204" pitchFamily="18" charset="0"/>
                           <a:cs typeface="Segoe UI" panose="020B0502040204020203" pitchFamily="34" charset="0"/>
                         </a:rPr>
-                        <m:t>𝑙</m:t>
+                        <m:t>𝑝</m:t>
                       </m:r>
                       <m:r>
                         <a:rPr lang="en-US" b="0" i="1" smtClean="0">
@@ -16444,13 +16432,13 @@
                   <a:rPr lang="en-US" dirty="0">
                     <a:latin typeface="+mn-lt"/>
                   </a:rPr>
-                  <a:t>Appropriate only for </a:t>
+                  <a:t>Assumes </a:t>
                 </a:r>
                 <a:r>
                   <a:rPr lang="en-US" b="1" dirty="0">
                     <a:latin typeface="+mn-lt"/>
                   </a:rPr>
-                  <a:t>Euclidean space  </a:t>
+                  <a:t>Normally distributed variables </a:t>
                 </a:r>
               </a:p>
               <a:p>
@@ -27149,7 +27137,7 @@
               <a:rPr lang="en-US" dirty="0">
                 <a:latin typeface="+mn-lt"/>
               </a:rPr>
-              <a:t>Transform problem to a new space where observations are linearly separable </a:t>
+              <a:t>Transform problem to a new 3D space where observations are linearly separable </a:t>
             </a:r>
             <a:endParaRPr lang="en-US" sz="3300" dirty="0">
               <a:latin typeface="+mn-lt"/>
@@ -27402,7 +27390,7 @@
               <a:rPr lang="en-US" dirty="0">
                 <a:latin typeface="+mn-lt"/>
               </a:rPr>
-              <a:t>Observations are not linearly separable in the original feature space</a:t>
+              <a:t>Observations are not linearly separable in the original 2D feature space</a:t>
             </a:r>
           </a:p>
           <a:p>
@@ -30530,8 +30518,8 @@
           </a:p>
         </p:txBody>
       </p:sp>
-      <mc:AlternateContent xmlns:mc="http://schemas.openxmlformats.org/markup-compatibility/2006" xmlns:a14="http://schemas.microsoft.com/office/drawing/2010/main">
-        <mc:Choice Requires="a14">
+      <mc:AlternateContent xmlns:mc="http://schemas.openxmlformats.org/markup-compatibility/2006">
+        <mc:Choice xmlns:a14="http://schemas.microsoft.com/office/drawing/2010/main" Requires="a14">
           <p:sp>
             <p:nvSpPr>
               <p:cNvPr id="3" name="Content Placeholder 2"/>
@@ -32053,7 +32041,19 @@
                   <a:rPr lang="en-US" sz="3000" dirty="0">
                     <a:latin typeface="+mn-lt"/>
                   </a:rPr>
-                  <a:t>Instead use the kernel which only requires an inner product and an exponentiation</a:t>
+                  <a:t>Instead using a </a:t>
+                </a:r>
+                <a:r>
+                  <a:rPr lang="en-US" sz="3000" b="1" dirty="0">
+                    <a:latin typeface="+mn-lt"/>
+                  </a:rPr>
+                  <a:t>kernel only requires an inner product </a:t>
+                </a:r>
+                <a:r>
+                  <a:rPr lang="en-US" sz="3000" dirty="0">
+                    <a:latin typeface="+mn-lt"/>
+                  </a:rPr>
+                  <a:t>and an exponentiation</a:t>
                 </a:r>
               </a:p>
               <a:p>
@@ -32087,7 +32087,7 @@
             </p:txBody>
           </p:sp>
         </mc:Choice>
-        <mc:Fallback xmlns="">
+        <mc:Fallback>
           <p:sp>
             <p:nvSpPr>
               <p:cNvPr id="3" name="Content Placeholder 2"/>
@@ -32981,8 +32981,8 @@
           </a:p>
         </p:txBody>
       </p:sp>
-      <mc:AlternateContent xmlns:mc="http://schemas.openxmlformats.org/markup-compatibility/2006" xmlns:a14="http://schemas.microsoft.com/office/drawing/2010/main">
-        <mc:Choice Requires="a14">
+      <mc:AlternateContent xmlns:mc="http://schemas.openxmlformats.org/markup-compatibility/2006">
+        <mc:Choice xmlns:a14="http://schemas.microsoft.com/office/drawing/2010/main" Requires="a14">
           <p:sp>
             <p:nvSpPr>
               <p:cNvPr id="3" name="Content Placeholder 2"/>
@@ -33388,7 +33388,7 @@
                   <a:rPr lang="en-US" dirty="0">
                     <a:latin typeface="+mn-lt"/>
                   </a:rPr>
-                  <a:t>Weights, </a:t>
+                  <a:t>Minimize least squares error to learn weights, </a:t>
                 </a:r>
                 <a14:m>
                   <m:oMath xmlns:m="http://schemas.openxmlformats.org/officeDocument/2006/math">
@@ -33476,7 +33476,7 @@
                   <a:rPr lang="en-US" dirty="0">
                     <a:latin typeface="+mn-lt"/>
                   </a:rPr>
-                  <a:t> from basis functions are learned by minimizing least squares error  </a:t>
+                  <a:t> for basis functions</a:t>
                 </a:r>
               </a:p>
               <a:p>
@@ -33560,7 +33560,7 @@
             </p:txBody>
           </p:sp>
         </mc:Choice>
-        <mc:Fallback xmlns="">
+        <mc:Fallback>
           <p:sp>
             <p:nvSpPr>
               <p:cNvPr id="3" name="Content Placeholder 2"/>
@@ -34701,7 +34701,7 @@
               <a:rPr lang="en-US" dirty="0">
                 <a:latin typeface="+mn-lt"/>
               </a:rPr>
-              <a:t>Introduction to dimensionality reduction </a:t>
+              <a:t>Requirement for dimensionality reduction rooted in curse of dimensionality </a:t>
             </a:r>
           </a:p>
           <a:p>
@@ -34709,7 +34709,7 @@
               <a:rPr lang="en-US" dirty="0">
                 <a:latin typeface="+mn-lt"/>
               </a:rPr>
-              <a:t>Principle component analysis (PCA)</a:t>
+              <a:t>Principle component analysis (PCA), a linear projection </a:t>
             </a:r>
           </a:p>
           <a:p>
@@ -34717,7 +34717,7 @@
               <a:rPr lang="en-US" dirty="0">
                 <a:latin typeface="+mn-lt"/>
               </a:rPr>
-              <a:t>Singular value decomposition (SVD)</a:t>
+              <a:t>Singular value decomposition (SVD), efficient for large datasets</a:t>
             </a:r>
           </a:p>
           <a:p>
@@ -34725,7 +34725,19 @@
               <a:rPr lang="en-US" dirty="0">
                 <a:latin typeface="+mn-lt"/>
               </a:rPr>
-              <a:t>Kernel principle component analysis for non-linear projection    </a:t>
+              <a:t>Kernel principal component </a:t>
+            </a:r>
+            <a:r>
+              <a:rPr lang="en-US">
+                <a:latin typeface="+mn-lt"/>
+              </a:rPr>
+              <a:t>analysis provides </a:t>
+            </a:r>
+            <a:r>
+              <a:rPr lang="en-US" dirty="0">
+                <a:latin typeface="+mn-lt"/>
+              </a:rPr>
+              <a:t>non-linear projection    </a:t>
             </a:r>
           </a:p>
         </p:txBody>
@@ -34795,405 +34807,8 @@
           </a:p>
         </p:txBody>
       </p:sp>
-      <p:sp>
-        <p:nvSpPr>
-          <p:cNvPr id="3" name="Content Placeholder 2"/>
-          <p:cNvSpPr>
-            <a:spLocks noGrp="1"/>
-          </p:cNvSpPr>
-          <p:nvPr>
-            <p:ph sz="quarter" idx="10"/>
-          </p:nvPr>
-        </p:nvSpPr>
-        <p:spPr>
-          <a:xfrm>
-            <a:off x="537275" y="896079"/>
-            <a:ext cx="11321349" cy="5602877"/>
-          </a:xfrm>
-        </p:spPr>
-        <p:txBody>
-          <a:bodyPr>
-            <a:normAutofit/>
-          </a:bodyPr>
-          <a:lstStyle/>
-          <a:p>
-            <a:pPr marL="0" indent="0">
-              <a:buNone/>
-            </a:pPr>
-            <a:r>
-              <a:rPr lang="en-US" dirty="0">
-                <a:latin typeface="+mn-lt"/>
-              </a:rPr>
-              <a:t>The curse of dimensionality means that all clusters are the same in high dimensions</a:t>
-            </a:r>
-          </a:p>
-          <a:p>
-            <a:r>
-              <a:rPr lang="en-US" dirty="0">
-                <a:latin typeface="+mn-lt"/>
-              </a:rPr>
-              <a:t>Sampling density decreases exponentially   </a:t>
-            </a:r>
-          </a:p>
-          <a:p>
-            <a:r>
-              <a:rPr lang="en-US" dirty="0">
-                <a:latin typeface="+mn-lt"/>
-              </a:rPr>
-              <a:t>Distances converge to the same length in a high dimensional space  </a:t>
-            </a:r>
-          </a:p>
-          <a:p>
-            <a:r>
-              <a:rPr lang="en-US" sz="2800" dirty="0">
-                <a:latin typeface="+mn-lt"/>
-              </a:rPr>
-              <a:t>The choice of metric does not help </a:t>
-            </a:r>
-          </a:p>
-          <a:p>
-            <a:pPr lvl="1"/>
-            <a:r>
-              <a:rPr lang="en-US" b="1" dirty="0">
-                <a:latin typeface="+mn-lt"/>
-              </a:rPr>
-              <a:t>All distances are the same in high dimensions!  </a:t>
-            </a:r>
-          </a:p>
-          <a:p>
-            <a:r>
-              <a:rPr lang="en-US" dirty="0">
-                <a:latin typeface="+mn-lt"/>
-              </a:rPr>
-              <a:t>Implication is that high-dimensional cluster models are easy to overfit!!</a:t>
-            </a:r>
-          </a:p>
-        </p:txBody>
-      </p:sp>
-    </p:spTree>
-    <p:extLst>
-      <p:ext uri="{BB962C8B-B14F-4D97-AF65-F5344CB8AC3E}">
-        <p14:creationId xmlns:p14="http://schemas.microsoft.com/office/powerpoint/2010/main" val="3920829184"/>
-      </p:ext>
-    </p:extLst>
-  </p:cSld>
-  <p:clrMapOvr>
-    <a:masterClrMapping/>
-  </p:clrMapOvr>
-  <p:timing>
-    <p:tnLst>
-      <p:par>
-        <p:cTn id="1" dur="indefinite" restart="never" nodeType="tmRoot">
-          <p:childTnLst>
-            <p:seq concurrent="1" nextAc="seek">
-              <p:cTn id="2" dur="indefinite" nodeType="mainSeq">
-                <p:childTnLst>
-                  <p:par>
-                    <p:cTn id="3" fill="hold">
-                      <p:stCondLst>
-                        <p:cond delay="indefinite"/>
-                      </p:stCondLst>
-                      <p:childTnLst>
-                        <p:par>
-                          <p:cTn id="4" fill="hold">
-                            <p:stCondLst>
-                              <p:cond delay="0"/>
-                            </p:stCondLst>
-                            <p:childTnLst>
-                              <p:par>
-                                <p:cTn id="5" presetID="1" presetClass="entr" presetSubtype="0" fill="hold" nodeType="clickEffect">
-                                  <p:stCondLst>
-                                    <p:cond delay="0"/>
-                                  </p:stCondLst>
-                                  <p:childTnLst>
-                                    <p:set>
-                                      <p:cBhvr>
-                                        <p:cTn id="6" dur="1" fill="hold">
-                                          <p:stCondLst>
-                                            <p:cond delay="0"/>
-                                          </p:stCondLst>
-                                        </p:cTn>
-                                        <p:tgtEl>
-                                          <p:spTgt spid="3">
-                                            <p:txEl>
-                                              <p:pRg st="1" end="1"/>
-                                            </p:txEl>
-                                          </p:spTgt>
-                                        </p:tgtEl>
-                                        <p:attrNameLst>
-                                          <p:attrName>style.visibility</p:attrName>
-                                        </p:attrNameLst>
-                                      </p:cBhvr>
-                                      <p:to>
-                                        <p:strVal val="visible"/>
-                                      </p:to>
-                                    </p:set>
-                                  </p:childTnLst>
-                                </p:cTn>
-                              </p:par>
-                            </p:childTnLst>
-                          </p:cTn>
-                        </p:par>
-                      </p:childTnLst>
-                    </p:cTn>
-                  </p:par>
-                  <p:par>
-                    <p:cTn id="7" fill="hold">
-                      <p:stCondLst>
-                        <p:cond delay="indefinite"/>
-                      </p:stCondLst>
-                      <p:childTnLst>
-                        <p:par>
-                          <p:cTn id="8" fill="hold">
-                            <p:stCondLst>
-                              <p:cond delay="0"/>
-                            </p:stCondLst>
-                            <p:childTnLst>
-                              <p:par>
-                                <p:cTn id="9" presetID="1" presetClass="entr" presetSubtype="0" fill="hold" nodeType="clickEffect">
-                                  <p:stCondLst>
-                                    <p:cond delay="0"/>
-                                  </p:stCondLst>
-                                  <p:childTnLst>
-                                    <p:set>
-                                      <p:cBhvr>
-                                        <p:cTn id="10" dur="1" fill="hold">
-                                          <p:stCondLst>
-                                            <p:cond delay="0"/>
-                                          </p:stCondLst>
-                                        </p:cTn>
-                                        <p:tgtEl>
-                                          <p:spTgt spid="3">
-                                            <p:txEl>
-                                              <p:pRg st="2" end="2"/>
-                                            </p:txEl>
-                                          </p:spTgt>
-                                        </p:tgtEl>
-                                        <p:attrNameLst>
-                                          <p:attrName>style.visibility</p:attrName>
-                                        </p:attrNameLst>
-                                      </p:cBhvr>
-                                      <p:to>
-                                        <p:strVal val="visible"/>
-                                      </p:to>
-                                    </p:set>
-                                  </p:childTnLst>
-                                </p:cTn>
-                              </p:par>
-                            </p:childTnLst>
-                          </p:cTn>
-                        </p:par>
-                      </p:childTnLst>
-                    </p:cTn>
-                  </p:par>
-                  <p:par>
-                    <p:cTn id="11" fill="hold">
-                      <p:stCondLst>
-                        <p:cond delay="indefinite"/>
-                      </p:stCondLst>
-                      <p:childTnLst>
-                        <p:par>
-                          <p:cTn id="12" fill="hold">
-                            <p:stCondLst>
-                              <p:cond delay="0"/>
-                            </p:stCondLst>
-                            <p:childTnLst>
-                              <p:par>
-                                <p:cTn id="13" presetID="1" presetClass="entr" presetSubtype="0" fill="hold" nodeType="clickEffect">
-                                  <p:stCondLst>
-                                    <p:cond delay="0"/>
-                                  </p:stCondLst>
-                                  <p:childTnLst>
-                                    <p:set>
-                                      <p:cBhvr>
-                                        <p:cTn id="14" dur="1" fill="hold">
-                                          <p:stCondLst>
-                                            <p:cond delay="0"/>
-                                          </p:stCondLst>
-                                        </p:cTn>
-                                        <p:tgtEl>
-                                          <p:spTgt spid="3">
-                                            <p:txEl>
-                                              <p:pRg st="3" end="3"/>
-                                            </p:txEl>
-                                          </p:spTgt>
-                                        </p:tgtEl>
-                                        <p:attrNameLst>
-                                          <p:attrName>style.visibility</p:attrName>
-                                        </p:attrNameLst>
-                                      </p:cBhvr>
-                                      <p:to>
-                                        <p:strVal val="visible"/>
-                                      </p:to>
-                                    </p:set>
-                                  </p:childTnLst>
-                                </p:cTn>
-                              </p:par>
-                              <p:par>
-                                <p:cTn id="15" presetID="1" presetClass="entr" presetSubtype="0" fill="hold" nodeType="withEffect">
-                                  <p:stCondLst>
-                                    <p:cond delay="0"/>
-                                  </p:stCondLst>
-                                  <p:childTnLst>
-                                    <p:set>
-                                      <p:cBhvr>
-                                        <p:cTn id="16" dur="1" fill="hold">
-                                          <p:stCondLst>
-                                            <p:cond delay="0"/>
-                                          </p:stCondLst>
-                                        </p:cTn>
-                                        <p:tgtEl>
-                                          <p:spTgt spid="3">
-                                            <p:txEl>
-                                              <p:pRg st="4" end="4"/>
-                                            </p:txEl>
-                                          </p:spTgt>
-                                        </p:tgtEl>
-                                        <p:attrNameLst>
-                                          <p:attrName>style.visibility</p:attrName>
-                                        </p:attrNameLst>
-                                      </p:cBhvr>
-                                      <p:to>
-                                        <p:strVal val="visible"/>
-                                      </p:to>
-                                    </p:set>
-                                  </p:childTnLst>
-                                </p:cTn>
-                              </p:par>
-                            </p:childTnLst>
-                          </p:cTn>
-                        </p:par>
-                      </p:childTnLst>
-                    </p:cTn>
-                  </p:par>
-                  <p:par>
-                    <p:cTn id="17" fill="hold">
-                      <p:stCondLst>
-                        <p:cond delay="indefinite"/>
-                      </p:stCondLst>
-                      <p:childTnLst>
-                        <p:par>
-                          <p:cTn id="18" fill="hold">
-                            <p:stCondLst>
-                              <p:cond delay="0"/>
-                            </p:stCondLst>
-                            <p:childTnLst>
-                              <p:par>
-                                <p:cTn id="19" presetID="1" presetClass="entr" presetSubtype="0" fill="hold" nodeType="clickEffect">
-                                  <p:stCondLst>
-                                    <p:cond delay="0"/>
-                                  </p:stCondLst>
-                                  <p:childTnLst>
-                                    <p:set>
-                                      <p:cBhvr>
-                                        <p:cTn id="20" dur="1" fill="hold">
-                                          <p:stCondLst>
-                                            <p:cond delay="0"/>
-                                          </p:stCondLst>
-                                        </p:cTn>
-                                        <p:tgtEl>
-                                          <p:spTgt spid="3">
-                                            <p:txEl>
-                                              <p:pRg st="5" end="5"/>
-                                            </p:txEl>
-                                          </p:spTgt>
-                                        </p:tgtEl>
-                                        <p:attrNameLst>
-                                          <p:attrName>style.visibility</p:attrName>
-                                        </p:attrNameLst>
-                                      </p:cBhvr>
-                                      <p:to>
-                                        <p:strVal val="visible"/>
-                                      </p:to>
-                                    </p:set>
-                                  </p:childTnLst>
-                                </p:cTn>
-                              </p:par>
-                            </p:childTnLst>
-                          </p:cTn>
-                        </p:par>
-                      </p:childTnLst>
-                    </p:cTn>
-                  </p:par>
-                </p:childTnLst>
-              </p:cTn>
-              <p:prevCondLst>
-                <p:cond evt="onPrev" delay="0">
-                  <p:tgtEl>
-                    <p:sldTgt/>
-                  </p:tgtEl>
-                </p:cond>
-              </p:prevCondLst>
-              <p:nextCondLst>
-                <p:cond evt="onNext" delay="0">
-                  <p:tgtEl>
-                    <p:sldTgt/>
-                  </p:tgtEl>
-                </p:cond>
-              </p:nextCondLst>
-            </p:seq>
-          </p:childTnLst>
-        </p:cTn>
-      </p:par>
-    </p:tnLst>
-  </p:timing>
-</p:sld>
-</file>
-
-<file path=ppt/slides/slide6.xml><?xml version="1.0" encoding="utf-8"?>
-<p:sld xmlns:a="http://schemas.openxmlformats.org/drawingml/2006/main" xmlns:r="http://schemas.openxmlformats.org/officeDocument/2006/relationships" xmlns:p="http://schemas.openxmlformats.org/presentationml/2006/main">
-  <p:cSld>
-    <p:spTree>
-      <p:nvGrpSpPr>
-        <p:cNvPr id="1" name=""/>
-        <p:cNvGrpSpPr/>
-        <p:nvPr/>
-      </p:nvGrpSpPr>
-      <p:grpSpPr>
-        <a:xfrm>
-          <a:off x="0" y="0"/>
-          <a:ext cx="0" cy="0"/>
-          <a:chOff x="0" y="0"/>
-          <a:chExt cx="0" cy="0"/>
-        </a:xfrm>
-      </p:grpSpPr>
-      <p:sp>
-        <p:nvSpPr>
-          <p:cNvPr id="2" name="Title 1"/>
-          <p:cNvSpPr>
-            <a:spLocks noGrp="1"/>
-          </p:cNvSpPr>
-          <p:nvPr>
-            <p:ph type="title"/>
-          </p:nvPr>
-        </p:nvSpPr>
-        <p:spPr>
-          <a:xfrm>
-            <a:off x="584200" y="221992"/>
-            <a:ext cx="11404600" cy="530954"/>
-          </a:xfrm>
-        </p:spPr>
-        <p:txBody>
-          <a:bodyPr>
-            <a:noAutofit/>
-          </a:bodyPr>
-          <a:lstStyle/>
-          <a:p>
-            <a:r>
-              <a:rPr lang="en-US" sz="3200" dirty="0"/>
-              <a:t>What Could Possibly Go Wrong? </a:t>
-            </a:r>
-            <a:r>
-              <a:rPr lang="en-US" sz="4000" dirty="0">
-                <a:latin typeface="Script MT Bold" panose="03040602040607080904" pitchFamily="66" charset="0"/>
-              </a:rPr>
-              <a:t>Curse of Dimensionality</a:t>
-            </a:r>
-          </a:p>
-        </p:txBody>
-      </p:sp>
-      <mc:AlternateContent xmlns:mc="http://schemas.openxmlformats.org/markup-compatibility/2006">
-        <mc:Choice xmlns:a14="http://schemas.microsoft.com/office/drawing/2010/main" Requires="a14">
+      <mc:AlternateContent xmlns:mc="http://schemas.openxmlformats.org/markup-compatibility/2006" xmlns:a14="http://schemas.microsoft.com/office/drawing/2010/main">
+        <mc:Choice Requires="a14">
           <p:sp>
             <p:nvSpPr>
               <p:cNvPr id="3" name="Content Placeholder 2"/>
@@ -35762,7 +35377,7 @@
             </p:txBody>
           </p:sp>
         </mc:Choice>
-        <mc:Fallback>
+        <mc:Fallback xmlns="">
           <p:sp>
             <p:nvSpPr>
               <p:cNvPr id="3" name="Content Placeholder 2"/>
@@ -36163,7 +35778,7 @@
 </p:sld>
 </file>
 
-<file path=ppt/slides/slide7.xml><?xml version="1.0" encoding="utf-8"?>
+<file path=ppt/slides/slide6.xml><?xml version="1.0" encoding="utf-8"?>
 <p:sld xmlns:a="http://schemas.openxmlformats.org/drawingml/2006/main" xmlns:r="http://schemas.openxmlformats.org/officeDocument/2006/relationships" xmlns:p="http://schemas.openxmlformats.org/presentationml/2006/main">
   <p:cSld>
     <p:spTree>
@@ -36215,8 +35830,8 @@
           </a:p>
         </p:txBody>
       </p:sp>
-      <mc:AlternateContent xmlns:mc="http://schemas.openxmlformats.org/markup-compatibility/2006">
-        <mc:Choice xmlns:a14="http://schemas.microsoft.com/office/drawing/2010/main" Requires="a14">
+      <mc:AlternateContent xmlns:mc="http://schemas.openxmlformats.org/markup-compatibility/2006" xmlns:a14="http://schemas.microsoft.com/office/drawing/2010/main">
+        <mc:Choice Requires="a14">
           <p:sp>
             <p:nvSpPr>
               <p:cNvPr id="3" name="Content Placeholder 2"/>
@@ -36336,7 +35951,7 @@
             </p:txBody>
           </p:sp>
         </mc:Choice>
-        <mc:Fallback>
+        <mc:Fallback xmlns="">
           <p:sp>
             <p:nvSpPr>
               <p:cNvPr id="3" name="Content Placeholder 2"/>
@@ -36417,6 +36032,403 @@
 </p:sld>
 </file>
 
+<file path=ppt/slides/slide7.xml><?xml version="1.0" encoding="utf-8"?>
+<p:sld xmlns:a="http://schemas.openxmlformats.org/drawingml/2006/main" xmlns:r="http://schemas.openxmlformats.org/officeDocument/2006/relationships" xmlns:p="http://schemas.openxmlformats.org/presentationml/2006/main">
+  <p:cSld>
+    <p:spTree>
+      <p:nvGrpSpPr>
+        <p:cNvPr id="1" name=""/>
+        <p:cNvGrpSpPr/>
+        <p:nvPr/>
+      </p:nvGrpSpPr>
+      <p:grpSpPr>
+        <a:xfrm>
+          <a:off x="0" y="0"/>
+          <a:ext cx="0" cy="0"/>
+          <a:chOff x="0" y="0"/>
+          <a:chExt cx="0" cy="0"/>
+        </a:xfrm>
+      </p:grpSpPr>
+      <p:sp>
+        <p:nvSpPr>
+          <p:cNvPr id="2" name="Title 1"/>
+          <p:cNvSpPr>
+            <a:spLocks noGrp="1"/>
+          </p:cNvSpPr>
+          <p:nvPr>
+            <p:ph type="title"/>
+          </p:nvPr>
+        </p:nvSpPr>
+        <p:spPr>
+          <a:xfrm>
+            <a:off x="584200" y="221992"/>
+            <a:ext cx="11404600" cy="530954"/>
+          </a:xfrm>
+        </p:spPr>
+        <p:txBody>
+          <a:bodyPr>
+            <a:noAutofit/>
+          </a:bodyPr>
+          <a:lstStyle/>
+          <a:p>
+            <a:r>
+              <a:rPr lang="en-US" sz="3200" dirty="0"/>
+              <a:t>What Could Possibly Go Wrong? </a:t>
+            </a:r>
+            <a:r>
+              <a:rPr lang="en-US" sz="4000" dirty="0">
+                <a:latin typeface="Script MT Bold" panose="03040602040607080904" pitchFamily="66" charset="0"/>
+              </a:rPr>
+              <a:t>Curse of Dimensionality</a:t>
+            </a:r>
+          </a:p>
+        </p:txBody>
+      </p:sp>
+      <p:sp>
+        <p:nvSpPr>
+          <p:cNvPr id="3" name="Content Placeholder 2"/>
+          <p:cNvSpPr>
+            <a:spLocks noGrp="1"/>
+          </p:cNvSpPr>
+          <p:nvPr>
+            <p:ph sz="quarter" idx="10"/>
+          </p:nvPr>
+        </p:nvSpPr>
+        <p:spPr>
+          <a:xfrm>
+            <a:off x="537275" y="896079"/>
+            <a:ext cx="11321349" cy="5602877"/>
+          </a:xfrm>
+        </p:spPr>
+        <p:txBody>
+          <a:bodyPr>
+            <a:normAutofit/>
+          </a:bodyPr>
+          <a:lstStyle/>
+          <a:p>
+            <a:pPr marL="0" indent="0">
+              <a:buNone/>
+            </a:pPr>
+            <a:r>
+              <a:rPr lang="en-US" dirty="0">
+                <a:latin typeface="+mn-lt"/>
+              </a:rPr>
+              <a:t>The curse of dimensionality means that all clusters are the same in high dimensions</a:t>
+            </a:r>
+          </a:p>
+          <a:p>
+            <a:r>
+              <a:rPr lang="en-US" dirty="0">
+                <a:latin typeface="+mn-lt"/>
+              </a:rPr>
+              <a:t>Sampling density decreases exponentially   </a:t>
+            </a:r>
+          </a:p>
+          <a:p>
+            <a:r>
+              <a:rPr lang="en-US" dirty="0">
+                <a:latin typeface="+mn-lt"/>
+              </a:rPr>
+              <a:t>Distances converge to the same length in a high dimensional space  </a:t>
+            </a:r>
+          </a:p>
+          <a:p>
+            <a:r>
+              <a:rPr lang="en-US" sz="2800" dirty="0">
+                <a:latin typeface="+mn-lt"/>
+              </a:rPr>
+              <a:t>The choice of metric does not help </a:t>
+            </a:r>
+          </a:p>
+          <a:p>
+            <a:pPr lvl="1"/>
+            <a:r>
+              <a:rPr lang="en-US" b="1" dirty="0">
+                <a:latin typeface="+mn-lt"/>
+              </a:rPr>
+              <a:t>All distances are the same in high dimensions!  </a:t>
+            </a:r>
+          </a:p>
+          <a:p>
+            <a:r>
+              <a:rPr lang="en-US" dirty="0">
+                <a:latin typeface="+mn-lt"/>
+              </a:rPr>
+              <a:t>Implication is that high-dimensional cluster models are easy to overfit!!</a:t>
+            </a:r>
+          </a:p>
+        </p:txBody>
+      </p:sp>
+    </p:spTree>
+    <p:extLst>
+      <p:ext uri="{BB962C8B-B14F-4D97-AF65-F5344CB8AC3E}">
+        <p14:creationId xmlns:p14="http://schemas.microsoft.com/office/powerpoint/2010/main" val="3920829184"/>
+      </p:ext>
+    </p:extLst>
+  </p:cSld>
+  <p:clrMapOvr>
+    <a:masterClrMapping/>
+  </p:clrMapOvr>
+  <p:timing>
+    <p:tnLst>
+      <p:par>
+        <p:cTn id="1" dur="indefinite" restart="never" nodeType="tmRoot">
+          <p:childTnLst>
+            <p:seq concurrent="1" nextAc="seek">
+              <p:cTn id="2" dur="indefinite" nodeType="mainSeq">
+                <p:childTnLst>
+                  <p:par>
+                    <p:cTn id="3" fill="hold">
+                      <p:stCondLst>
+                        <p:cond delay="indefinite"/>
+                      </p:stCondLst>
+                      <p:childTnLst>
+                        <p:par>
+                          <p:cTn id="4" fill="hold">
+                            <p:stCondLst>
+                              <p:cond delay="0"/>
+                            </p:stCondLst>
+                            <p:childTnLst>
+                              <p:par>
+                                <p:cTn id="5" presetID="1" presetClass="entr" presetSubtype="0" fill="hold" nodeType="clickEffect">
+                                  <p:stCondLst>
+                                    <p:cond delay="0"/>
+                                  </p:stCondLst>
+                                  <p:childTnLst>
+                                    <p:set>
+                                      <p:cBhvr>
+                                        <p:cTn id="6" dur="1" fill="hold">
+                                          <p:stCondLst>
+                                            <p:cond delay="0"/>
+                                          </p:stCondLst>
+                                        </p:cTn>
+                                        <p:tgtEl>
+                                          <p:spTgt spid="3">
+                                            <p:txEl>
+                                              <p:pRg st="1" end="1"/>
+                                            </p:txEl>
+                                          </p:spTgt>
+                                        </p:tgtEl>
+                                        <p:attrNameLst>
+                                          <p:attrName>style.visibility</p:attrName>
+                                        </p:attrNameLst>
+                                      </p:cBhvr>
+                                      <p:to>
+                                        <p:strVal val="visible"/>
+                                      </p:to>
+                                    </p:set>
+                                  </p:childTnLst>
+                                </p:cTn>
+                              </p:par>
+                            </p:childTnLst>
+                          </p:cTn>
+                        </p:par>
+                      </p:childTnLst>
+                    </p:cTn>
+                  </p:par>
+                  <p:par>
+                    <p:cTn id="7" fill="hold">
+                      <p:stCondLst>
+                        <p:cond delay="indefinite"/>
+                      </p:stCondLst>
+                      <p:childTnLst>
+                        <p:par>
+                          <p:cTn id="8" fill="hold">
+                            <p:stCondLst>
+                              <p:cond delay="0"/>
+                            </p:stCondLst>
+                            <p:childTnLst>
+                              <p:par>
+                                <p:cTn id="9" presetID="1" presetClass="entr" presetSubtype="0" fill="hold" nodeType="clickEffect">
+                                  <p:stCondLst>
+                                    <p:cond delay="0"/>
+                                  </p:stCondLst>
+                                  <p:childTnLst>
+                                    <p:set>
+                                      <p:cBhvr>
+                                        <p:cTn id="10" dur="1" fill="hold">
+                                          <p:stCondLst>
+                                            <p:cond delay="0"/>
+                                          </p:stCondLst>
+                                        </p:cTn>
+                                        <p:tgtEl>
+                                          <p:spTgt spid="3">
+                                            <p:txEl>
+                                              <p:pRg st="2" end="2"/>
+                                            </p:txEl>
+                                          </p:spTgt>
+                                        </p:tgtEl>
+                                        <p:attrNameLst>
+                                          <p:attrName>style.visibility</p:attrName>
+                                        </p:attrNameLst>
+                                      </p:cBhvr>
+                                      <p:to>
+                                        <p:strVal val="visible"/>
+                                      </p:to>
+                                    </p:set>
+                                  </p:childTnLst>
+                                </p:cTn>
+                              </p:par>
+                            </p:childTnLst>
+                          </p:cTn>
+                        </p:par>
+                      </p:childTnLst>
+                    </p:cTn>
+                  </p:par>
+                  <p:par>
+                    <p:cTn id="11" fill="hold">
+                      <p:stCondLst>
+                        <p:cond delay="indefinite"/>
+                      </p:stCondLst>
+                      <p:childTnLst>
+                        <p:par>
+                          <p:cTn id="12" fill="hold">
+                            <p:stCondLst>
+                              <p:cond delay="0"/>
+                            </p:stCondLst>
+                            <p:childTnLst>
+                              <p:par>
+                                <p:cTn id="13" presetID="1" presetClass="entr" presetSubtype="0" fill="hold" nodeType="clickEffect">
+                                  <p:stCondLst>
+                                    <p:cond delay="0"/>
+                                  </p:stCondLst>
+                                  <p:childTnLst>
+                                    <p:set>
+                                      <p:cBhvr>
+                                        <p:cTn id="14" dur="1" fill="hold">
+                                          <p:stCondLst>
+                                            <p:cond delay="0"/>
+                                          </p:stCondLst>
+                                        </p:cTn>
+                                        <p:tgtEl>
+                                          <p:spTgt spid="3">
+                                            <p:txEl>
+                                              <p:pRg st="3" end="3"/>
+                                            </p:txEl>
+                                          </p:spTgt>
+                                        </p:tgtEl>
+                                        <p:attrNameLst>
+                                          <p:attrName>style.visibility</p:attrName>
+                                        </p:attrNameLst>
+                                      </p:cBhvr>
+                                      <p:to>
+                                        <p:strVal val="visible"/>
+                                      </p:to>
+                                    </p:set>
+                                  </p:childTnLst>
+                                </p:cTn>
+                              </p:par>
+                              <p:par>
+                                <p:cTn id="15" presetID="1" presetClass="entr" presetSubtype="0" fill="hold" nodeType="withEffect">
+                                  <p:stCondLst>
+                                    <p:cond delay="0"/>
+                                  </p:stCondLst>
+                                  <p:childTnLst>
+                                    <p:set>
+                                      <p:cBhvr>
+                                        <p:cTn id="16" dur="1" fill="hold">
+                                          <p:stCondLst>
+                                            <p:cond delay="0"/>
+                                          </p:stCondLst>
+                                        </p:cTn>
+                                        <p:tgtEl>
+                                          <p:spTgt spid="3">
+                                            <p:txEl>
+                                              <p:pRg st="4" end="4"/>
+                                            </p:txEl>
+                                          </p:spTgt>
+                                        </p:tgtEl>
+                                        <p:attrNameLst>
+                                          <p:attrName>style.visibility</p:attrName>
+                                        </p:attrNameLst>
+                                      </p:cBhvr>
+                                      <p:to>
+                                        <p:strVal val="visible"/>
+                                      </p:to>
+                                    </p:set>
+                                  </p:childTnLst>
+                                </p:cTn>
+                              </p:par>
+                            </p:childTnLst>
+                          </p:cTn>
+                        </p:par>
+                      </p:childTnLst>
+                    </p:cTn>
+                  </p:par>
+                  <p:par>
+                    <p:cTn id="17" fill="hold">
+                      <p:stCondLst>
+                        <p:cond delay="indefinite"/>
+                      </p:stCondLst>
+                      <p:childTnLst>
+                        <p:par>
+                          <p:cTn id="18" fill="hold">
+                            <p:stCondLst>
+                              <p:cond delay="0"/>
+                            </p:stCondLst>
+                            <p:childTnLst>
+                              <p:par>
+                                <p:cTn id="19" presetID="1" presetClass="entr" presetSubtype="0" fill="hold" nodeType="clickEffect">
+                                  <p:stCondLst>
+                                    <p:cond delay="0"/>
+                                  </p:stCondLst>
+                                  <p:childTnLst>
+                                    <p:set>
+                                      <p:cBhvr>
+                                        <p:cTn id="20" dur="1" fill="hold">
+                                          <p:stCondLst>
+                                            <p:cond delay="0"/>
+                                          </p:stCondLst>
+                                        </p:cTn>
+                                        <p:tgtEl>
+                                          <p:spTgt spid="3">
+                                            <p:txEl>
+                                              <p:pRg st="5" end="5"/>
+                                            </p:txEl>
+                                          </p:spTgt>
+                                        </p:tgtEl>
+                                        <p:attrNameLst>
+                                          <p:attrName>style.visibility</p:attrName>
+                                        </p:attrNameLst>
+                                      </p:cBhvr>
+                                      <p:to>
+                                        <p:strVal val="visible"/>
+                                      </p:to>
+                                    </p:set>
+                                  </p:childTnLst>
+                                </p:cTn>
+                              </p:par>
+                            </p:childTnLst>
+                          </p:cTn>
+                        </p:par>
+                      </p:childTnLst>
+                    </p:cTn>
+                  </p:par>
+                </p:childTnLst>
+              </p:cTn>
+              <p:prevCondLst>
+                <p:cond evt="onPrev" delay="0">
+                  <p:tgtEl>
+                    <p:sldTgt/>
+                  </p:tgtEl>
+                </p:cond>
+              </p:prevCondLst>
+              <p:nextCondLst>
+                <p:cond evt="onNext" delay="0">
+                  <p:tgtEl>
+                    <p:sldTgt/>
+                  </p:tgtEl>
+                </p:cond>
+              </p:nextCondLst>
+            </p:seq>
+          </p:childTnLst>
+        </p:cTn>
+      </p:par>
+    </p:tnLst>
+  </p:timing>
+</p:sld>
+</file>
+
 <file path=ppt/slides/slide8.xml><?xml version="1.0" encoding="utf-8"?>
 <p:sld xmlns:a="http://schemas.openxmlformats.org/drawingml/2006/main" xmlns:r="http://schemas.openxmlformats.org/officeDocument/2006/relationships" xmlns:p="http://schemas.openxmlformats.org/presentationml/2006/main">
   <p:cSld>
@@ -36579,7 +36591,7 @@
               <a:rPr lang="en-US" dirty="0">
                 <a:latin typeface="+mn-lt"/>
               </a:rPr>
-              <a:t>Variational autoencoders (VAE) – beyond the scope of this course  </a:t>
+              <a:t>Autoencoders – beyond the scope of this course  </a:t>
             </a:r>
           </a:p>
           <a:p>

</xml_diff>